<commit_message>
[PYJ]Report 양식 수정 임시
M: Player Application Scene 부분
</commit_message>
<xml_diff>
--- a/report/씬 용.pptx
+++ b/report/씬 용.pptx
@@ -5244,10 +5244,10 @@
       </p:grpSpPr>
       <p:grpSp>
         <p:nvGrpSpPr>
-          <p:cNvPr id="182" name="그룹 181">
+          <p:cNvPr id="16" name="그룹 15">
             <a:extLst>
               <a:ext uri="{FF2B5EF4-FFF2-40B4-BE49-F238E27FC236}">
-                <a16:creationId xmlns:a16="http://schemas.microsoft.com/office/drawing/2014/main" id="{0326FE31-AEA5-4AB6-BF5C-6C2F8E66AA89}"/>
+                <a16:creationId xmlns:a16="http://schemas.microsoft.com/office/drawing/2014/main" id="{57039883-D615-4950-82CF-D44854A8FDE4}"/>
               </a:ext>
             </a:extLst>
           </p:cNvPr>
@@ -5256,18 +5256,74 @@
         </p:nvGrpSpPr>
         <p:grpSpPr>
           <a:xfrm>
-            <a:off x="4745680" y="2037558"/>
-            <a:ext cx="2949462" cy="4655126"/>
-            <a:chOff x="985814" y="1109819"/>
-            <a:chExt cx="2949462" cy="4655126"/>
+            <a:off x="3769969" y="2225446"/>
+            <a:ext cx="2951016" cy="4653478"/>
+            <a:chOff x="710018" y="1452764"/>
+            <a:chExt cx="2906280" cy="4653478"/>
           </a:xfrm>
         </p:grpSpPr>
+        <p:sp>
+          <p:nvSpPr>
+            <p:cNvPr id="160" name="직사각형 159">
+              <a:extLst>
+                <a:ext uri="{FF2B5EF4-FFF2-40B4-BE49-F238E27FC236}">
+                  <a16:creationId xmlns:a16="http://schemas.microsoft.com/office/drawing/2014/main" id="{B39179AC-AD7F-47B0-B12D-0A7175ACDB39}"/>
+                </a:ext>
+              </a:extLst>
+            </p:cNvPr>
+            <p:cNvSpPr/>
+            <p:nvPr/>
+          </p:nvSpPr>
+          <p:spPr>
+            <a:xfrm>
+              <a:off x="710018" y="1452764"/>
+              <a:ext cx="2906280" cy="4653478"/>
+            </a:xfrm>
+            <a:prstGeom prst="rect">
+              <a:avLst/>
+            </a:prstGeom>
+            <a:solidFill>
+              <a:schemeClr val="bg1">
+                <a:lumMod val="95000"/>
+              </a:schemeClr>
+            </a:solidFill>
+            <a:ln>
+              <a:noFill/>
+            </a:ln>
+          </p:spPr>
+          <p:style>
+            <a:lnRef idx="1">
+              <a:schemeClr val="accent3"/>
+            </a:lnRef>
+            <a:fillRef idx="2">
+              <a:schemeClr val="accent3"/>
+            </a:fillRef>
+            <a:effectRef idx="1">
+              <a:schemeClr val="accent3"/>
+            </a:effectRef>
+            <a:fontRef idx="minor">
+              <a:schemeClr val="dk1"/>
+            </a:fontRef>
+          </p:style>
+          <p:txBody>
+            <a:bodyPr rtlCol="0" anchor="ctr" anchorCtr="0"/>
+            <a:lstStyle/>
+            <a:p>
+              <a:pPr algn="ctr"/>
+              <a:r>
+                <a:rPr lang="ko-KR" altLang="en-US" dirty="0"/>
+                <a:t>주관식 창</a:t>
+              </a:r>
+              <a:endParaRPr lang="en-US" altLang="ko-KR" dirty="0"/>
+            </a:p>
+          </p:txBody>
+        </p:sp>
         <p:grpSp>
           <p:nvGrpSpPr>
-            <p:cNvPr id="183" name="그룹 182">
+            <p:cNvPr id="15" name="그룹 14">
               <a:extLst>
                 <a:ext uri="{FF2B5EF4-FFF2-40B4-BE49-F238E27FC236}">
-                  <a16:creationId xmlns:a16="http://schemas.microsoft.com/office/drawing/2014/main" id="{4D3704C8-6276-43C4-A17C-F2AAD4FA6536}"/>
+                  <a16:creationId xmlns:a16="http://schemas.microsoft.com/office/drawing/2014/main" id="{F9A56900-433E-4693-9906-8937F08ED606}"/>
                 </a:ext>
               </a:extLst>
             </p:cNvPr>
@@ -5276,18 +5332,18 @@
           </p:nvGrpSpPr>
           <p:grpSpPr>
             <a:xfrm>
-              <a:off x="985814" y="1109819"/>
-              <a:ext cx="2949462" cy="4655126"/>
-              <a:chOff x="1006537" y="1471749"/>
-              <a:chExt cx="2949462" cy="4294621"/>
+              <a:off x="917849" y="5462657"/>
+              <a:ext cx="2489980" cy="433911"/>
+              <a:chOff x="917849" y="5462657"/>
+              <a:chExt cx="2489980" cy="433911"/>
             </a:xfrm>
           </p:grpSpPr>
           <p:sp>
             <p:nvSpPr>
-              <p:cNvPr id="185" name="직사각형 184">
+              <p:cNvPr id="13" name="직사각형 12">
                 <a:extLst>
                   <a:ext uri="{FF2B5EF4-FFF2-40B4-BE49-F238E27FC236}">
-                    <a16:creationId xmlns:a16="http://schemas.microsoft.com/office/drawing/2014/main" id="{F85514B7-F2B4-48A9-A10A-F5A1083B0D72}"/>
+                    <a16:creationId xmlns:a16="http://schemas.microsoft.com/office/drawing/2014/main" id="{892789DE-7DC7-44C3-83E2-E0493EAAC800}"/>
                   </a:ext>
                 </a:extLst>
               </p:cNvPr>
@@ -5296,29 +5352,21 @@
             </p:nvSpPr>
             <p:spPr>
               <a:xfrm>
-                <a:off x="1006537" y="1471749"/>
-                <a:ext cx="2949462" cy="4294621"/>
+                <a:off x="917849" y="5462657"/>
+                <a:ext cx="1900257" cy="433911"/>
               </a:xfrm>
               <a:prstGeom prst="rect">
                 <a:avLst/>
               </a:prstGeom>
-              <a:solidFill>
-                <a:schemeClr val="bg1">
-                  <a:lumMod val="95000"/>
-                </a:schemeClr>
-              </a:solidFill>
-              <a:ln>
-                <a:noFill/>
-              </a:ln>
             </p:spPr>
             <p:style>
-              <a:lnRef idx="1">
+              <a:lnRef idx="2">
                 <a:schemeClr val="accent3"/>
               </a:lnRef>
-              <a:fillRef idx="2">
-                <a:schemeClr val="accent3"/>
+              <a:fillRef idx="1">
+                <a:schemeClr val="lt1"/>
               </a:fillRef>
-              <a:effectRef idx="1">
+              <a:effectRef idx="0">
                 <a:schemeClr val="accent3"/>
               </a:effectRef>
               <a:fontRef idx="minor">
@@ -5326,24 +5374,20 @@
               </a:fontRef>
             </p:style>
             <p:txBody>
-              <a:bodyPr rtlCol="0" anchor="ctr" anchorCtr="0"/>
+              <a:bodyPr rtlCol="0" anchor="ctr"/>
               <a:lstStyle/>
               <a:p>
                 <a:pPr algn="ctr"/>
-                <a:r>
-                  <a:rPr lang="ko-KR" altLang="en-US" dirty="0"/>
-                  <a:t>주관식 창</a:t>
-                </a:r>
-                <a:endParaRPr lang="en-US" altLang="ko-KR" dirty="0"/>
+                <a:endParaRPr lang="ko-KR" altLang="en-US"/>
               </a:p>
             </p:txBody>
           </p:sp>
           <p:sp>
             <p:nvSpPr>
-              <p:cNvPr id="186" name="타원 185">
+              <p:cNvPr id="14" name="사각형: 둥근 모서리 13">
                 <a:extLst>
                   <a:ext uri="{FF2B5EF4-FFF2-40B4-BE49-F238E27FC236}">
-                    <a16:creationId xmlns:a16="http://schemas.microsoft.com/office/drawing/2014/main" id="{F6025C50-6854-458F-B457-7486B5A858CA}"/>
+                    <a16:creationId xmlns:a16="http://schemas.microsoft.com/office/drawing/2014/main" id="{CC9B4577-6CDB-48B4-B620-42E83AAB0FA0}"/>
                   </a:ext>
                 </a:extLst>
               </p:cNvPr>
@@ -5352,10 +5396,10 @@
             </p:nvSpPr>
             <p:spPr>
               <a:xfrm>
-                <a:off x="1145997" y="1883015"/>
-                <a:ext cx="635412" cy="467252"/>
+                <a:off x="2950808" y="5467435"/>
+                <a:ext cx="457021" cy="429133"/>
               </a:xfrm>
-              <a:prstGeom prst="ellipse">
+              <a:prstGeom prst="roundRect">
                 <a:avLst/>
               </a:prstGeom>
             </p:spPr>
@@ -5380,69 +5424,98 @@
               <a:lstStyle/>
               <a:p>
                 <a:pPr algn="ctr"/>
-                <a:r>
-                  <a:rPr lang="ko-KR" altLang="en-US" sz="1000" dirty="0"/>
-                  <a:t>설정</a:t>
-                </a:r>
-              </a:p>
-            </p:txBody>
-          </p:sp>
-          <p:sp>
-            <p:nvSpPr>
-              <p:cNvPr id="187" name="타원 186">
-                <a:extLst>
-                  <a:ext uri="{FF2B5EF4-FFF2-40B4-BE49-F238E27FC236}">
-                    <a16:creationId xmlns:a16="http://schemas.microsoft.com/office/drawing/2014/main" id="{B863609C-6DA6-4DDB-BF68-839C9BF1A6B0}"/>
-                  </a:ext>
-                </a:extLst>
-              </p:cNvPr>
-              <p:cNvSpPr/>
-              <p:nvPr/>
-            </p:nvSpPr>
-            <p:spPr>
-              <a:xfrm>
-                <a:off x="1055065" y="2470861"/>
-                <a:ext cx="817277" cy="467252"/>
-              </a:xfrm>
-              <a:prstGeom prst="ellipse">
-                <a:avLst/>
-              </a:prstGeom>
-            </p:spPr>
-            <p:style>
-              <a:lnRef idx="2">
-                <a:schemeClr val="accent1">
-                  <a:shade val="50000"/>
-                </a:schemeClr>
-              </a:lnRef>
-              <a:fillRef idx="1">
-                <a:schemeClr val="accent1"/>
-              </a:fillRef>
-              <a:effectRef idx="0">
-                <a:schemeClr val="accent1"/>
-              </a:effectRef>
-              <a:fontRef idx="minor">
-                <a:schemeClr val="lt1"/>
-              </a:fontRef>
-            </p:style>
-            <p:txBody>
-              <a:bodyPr rtlCol="0" anchor="ctr"/>
-              <a:lstStyle/>
-              <a:p>
-                <a:pPr algn="ctr"/>
-                <a:r>
-                  <a:rPr lang="ko-KR" altLang="en-US" sz="1000" dirty="0"/>
-                  <a:t>주관식</a:t>
-                </a:r>
+                <a:endParaRPr lang="ko-KR" altLang="en-US"/>
               </a:p>
             </p:txBody>
           </p:sp>
         </p:grpSp>
+      </p:grpSp>
+      <p:sp>
+        <p:nvSpPr>
+          <p:cNvPr id="172" name="직사각형 171">
+            <a:extLst>
+              <a:ext uri="{FF2B5EF4-FFF2-40B4-BE49-F238E27FC236}">
+                <a16:creationId xmlns:a16="http://schemas.microsoft.com/office/drawing/2014/main" id="{CA91A1FB-8847-468D-BD09-102B4E3E1624}"/>
+              </a:ext>
+            </a:extLst>
+          </p:cNvPr>
+          <p:cNvSpPr/>
+          <p:nvPr/>
+        </p:nvSpPr>
+        <p:spPr>
+          <a:xfrm>
+            <a:off x="4957804" y="2311103"/>
+            <a:ext cx="2941033" cy="4655127"/>
+          </a:xfrm>
+          <a:prstGeom prst="rect">
+            <a:avLst/>
+          </a:prstGeom>
+          <a:solidFill>
+            <a:schemeClr val="bg1">
+              <a:lumMod val="85000"/>
+            </a:schemeClr>
+          </a:solidFill>
+          <a:ln>
+            <a:noFill/>
+          </a:ln>
+        </p:spPr>
+        <p:style>
+          <a:lnRef idx="1">
+            <a:schemeClr val="accent3"/>
+          </a:lnRef>
+          <a:fillRef idx="2">
+            <a:schemeClr val="accent3"/>
+          </a:fillRef>
+          <a:effectRef idx="1">
+            <a:schemeClr val="accent3"/>
+          </a:effectRef>
+          <a:fontRef idx="minor">
+            <a:schemeClr val="dk1"/>
+          </a:fontRef>
+        </p:style>
+        <p:txBody>
+          <a:bodyPr rtlCol="0" anchor="ctr" anchorCtr="0"/>
+          <a:lstStyle/>
+          <a:p>
+            <a:pPr algn="ctr"/>
+            <a:r>
+              <a:rPr lang="en-US" altLang="ko-KR" dirty="0"/>
+              <a:t>AR </a:t>
+            </a:r>
+            <a:r>
+              <a:rPr lang="ko-KR" altLang="en-US" dirty="0"/>
+              <a:t>화면</a:t>
+            </a:r>
+            <a:endParaRPr lang="en-US" altLang="ko-KR" dirty="0"/>
+          </a:p>
+        </p:txBody>
+      </p:sp>
+      <p:grpSp>
+        <p:nvGrpSpPr>
+          <p:cNvPr id="12" name="그룹 11">
+            <a:extLst>
+              <a:ext uri="{FF2B5EF4-FFF2-40B4-BE49-F238E27FC236}">
+                <a16:creationId xmlns:a16="http://schemas.microsoft.com/office/drawing/2014/main" id="{47BD73DA-DDDF-412C-B707-E688D61B6F85}"/>
+              </a:ext>
+            </a:extLst>
+          </p:cNvPr>
+          <p:cNvGrpSpPr/>
+          <p:nvPr/>
+        </p:nvGrpSpPr>
+        <p:grpSpPr>
+          <a:xfrm>
+            <a:off x="7202270" y="2483347"/>
+            <a:ext cx="2954271" cy="4654561"/>
+            <a:chOff x="684212" y="1092824"/>
+            <a:chExt cx="2954271" cy="4654561"/>
+          </a:xfrm>
+        </p:grpSpPr>
         <p:sp>
           <p:nvSpPr>
-            <p:cNvPr id="184" name="타원 183">
+            <p:cNvPr id="155" name="직사각형 154">
               <a:extLst>
                 <a:ext uri="{FF2B5EF4-FFF2-40B4-BE49-F238E27FC236}">
-                  <a16:creationId xmlns:a16="http://schemas.microsoft.com/office/drawing/2014/main" id="{81C0B2C3-2C31-488E-BC5C-81D649D91ADA}"/>
+                  <a16:creationId xmlns:a16="http://schemas.microsoft.com/office/drawing/2014/main" id="{B2F6E63F-8D35-4BB6-933E-A0E982AB85BD}"/>
                 </a:ext>
               </a:extLst>
             </p:cNvPr>
@@ -5451,341 +5524,8 @@
           </p:nvSpPr>
           <p:spPr>
             <a:xfrm>
-              <a:off x="1034342" y="2776324"/>
-              <a:ext cx="817277" cy="506475"/>
-            </a:xfrm>
-            <a:prstGeom prst="ellipse">
-              <a:avLst/>
-            </a:prstGeom>
-          </p:spPr>
-          <p:style>
-            <a:lnRef idx="2">
-              <a:schemeClr val="accent1">
-                <a:shade val="50000"/>
-              </a:schemeClr>
-            </a:lnRef>
-            <a:fillRef idx="1">
-              <a:schemeClr val="accent1"/>
-            </a:fillRef>
-            <a:effectRef idx="0">
-              <a:schemeClr val="accent1"/>
-            </a:effectRef>
-            <a:fontRef idx="minor">
-              <a:schemeClr val="lt1"/>
-            </a:fontRef>
-          </p:style>
-          <p:txBody>
-            <a:bodyPr rtlCol="0" anchor="ctr"/>
-            <a:lstStyle/>
-            <a:p>
-              <a:pPr algn="ctr"/>
-              <a:r>
-                <a:rPr lang="en-US" altLang="ko-KR" sz="1000" dirty="0"/>
-                <a:t>QR</a:t>
-              </a:r>
-            </a:p>
-            <a:p>
-              <a:pPr algn="ctr"/>
-              <a:r>
-                <a:rPr lang="ko-KR" altLang="en-US" sz="1000" dirty="0"/>
-                <a:t>코드</a:t>
-              </a:r>
-            </a:p>
-          </p:txBody>
-        </p:sp>
-      </p:grpSp>
-      <p:grpSp>
-        <p:nvGrpSpPr>
-          <p:cNvPr id="176" name="그룹 175">
-            <a:extLst>
-              <a:ext uri="{FF2B5EF4-FFF2-40B4-BE49-F238E27FC236}">
-                <a16:creationId xmlns:a16="http://schemas.microsoft.com/office/drawing/2014/main" id="{7C55BA27-FA6A-48DA-96AF-09F4D2E38AEF}"/>
-              </a:ext>
-            </a:extLst>
-          </p:cNvPr>
-          <p:cNvGrpSpPr/>
-          <p:nvPr/>
-        </p:nvGrpSpPr>
-        <p:grpSpPr>
-          <a:xfrm>
-            <a:off x="5673329" y="2126095"/>
-            <a:ext cx="2949462" cy="4655126"/>
-            <a:chOff x="985814" y="1109819"/>
-            <a:chExt cx="2949462" cy="4655126"/>
-          </a:xfrm>
-        </p:grpSpPr>
-        <p:grpSp>
-          <p:nvGrpSpPr>
-            <p:cNvPr id="169" name="그룹 168">
-              <a:extLst>
-                <a:ext uri="{FF2B5EF4-FFF2-40B4-BE49-F238E27FC236}">
-                  <a16:creationId xmlns:a16="http://schemas.microsoft.com/office/drawing/2014/main" id="{8BD5794D-D041-40EF-AFA0-CCE8E3B58CC6}"/>
-                </a:ext>
-              </a:extLst>
-            </p:cNvPr>
-            <p:cNvGrpSpPr/>
-            <p:nvPr/>
-          </p:nvGrpSpPr>
-          <p:grpSpPr>
-            <a:xfrm>
-              <a:off x="985814" y="1109819"/>
-              <a:ext cx="2949462" cy="4655126"/>
-              <a:chOff x="1006537" y="1471749"/>
-              <a:chExt cx="2949462" cy="4294621"/>
-            </a:xfrm>
-          </p:grpSpPr>
-          <p:sp>
-            <p:nvSpPr>
-              <p:cNvPr id="172" name="직사각형 171">
-                <a:extLst>
-                  <a:ext uri="{FF2B5EF4-FFF2-40B4-BE49-F238E27FC236}">
-                    <a16:creationId xmlns:a16="http://schemas.microsoft.com/office/drawing/2014/main" id="{CA91A1FB-8847-468D-BD09-102B4E3E1624}"/>
-                  </a:ext>
-                </a:extLst>
-              </p:cNvPr>
-              <p:cNvSpPr/>
-              <p:nvPr/>
-            </p:nvSpPr>
-            <p:spPr>
-              <a:xfrm>
-                <a:off x="1006537" y="1471749"/>
-                <a:ext cx="2949462" cy="4294621"/>
-              </a:xfrm>
-              <a:prstGeom prst="rect">
-                <a:avLst/>
-              </a:prstGeom>
-              <a:solidFill>
-                <a:schemeClr val="bg1">
-                  <a:lumMod val="85000"/>
-                </a:schemeClr>
-              </a:solidFill>
-              <a:ln>
-                <a:noFill/>
-              </a:ln>
-            </p:spPr>
-            <p:style>
-              <a:lnRef idx="1">
-                <a:schemeClr val="accent3"/>
-              </a:lnRef>
-              <a:fillRef idx="2">
-                <a:schemeClr val="accent3"/>
-              </a:fillRef>
-              <a:effectRef idx="1">
-                <a:schemeClr val="accent3"/>
-              </a:effectRef>
-              <a:fontRef idx="minor">
-                <a:schemeClr val="dk1"/>
-              </a:fontRef>
-            </p:style>
-            <p:txBody>
-              <a:bodyPr rtlCol="0" anchor="ctr" anchorCtr="0"/>
-              <a:lstStyle/>
-              <a:p>
-                <a:pPr algn="ctr"/>
-                <a:r>
-                  <a:rPr lang="en-US" altLang="ko-KR" dirty="0"/>
-                  <a:t>AR </a:t>
-                </a:r>
-                <a:r>
-                  <a:rPr lang="ko-KR" altLang="en-US" dirty="0"/>
-                  <a:t>화면</a:t>
-                </a:r>
-                <a:endParaRPr lang="en-US" altLang="ko-KR" dirty="0"/>
-              </a:p>
-            </p:txBody>
-          </p:sp>
-          <p:sp>
-            <p:nvSpPr>
-              <p:cNvPr id="173" name="타원 172">
-                <a:extLst>
-                  <a:ext uri="{FF2B5EF4-FFF2-40B4-BE49-F238E27FC236}">
-                    <a16:creationId xmlns:a16="http://schemas.microsoft.com/office/drawing/2014/main" id="{A91719C6-CDDD-437E-B7E6-989A08278A8E}"/>
-                  </a:ext>
-                </a:extLst>
-              </p:cNvPr>
-              <p:cNvSpPr/>
-              <p:nvPr/>
-            </p:nvSpPr>
-            <p:spPr>
-              <a:xfrm>
-                <a:off x="1145997" y="1883015"/>
-                <a:ext cx="635412" cy="467252"/>
-              </a:xfrm>
-              <a:prstGeom prst="ellipse">
-                <a:avLst/>
-              </a:prstGeom>
-            </p:spPr>
-            <p:style>
-              <a:lnRef idx="2">
-                <a:schemeClr val="accent1">
-                  <a:shade val="50000"/>
-                </a:schemeClr>
-              </a:lnRef>
-              <a:fillRef idx="1">
-                <a:schemeClr val="accent1"/>
-              </a:fillRef>
-              <a:effectRef idx="0">
-                <a:schemeClr val="accent1"/>
-              </a:effectRef>
-              <a:fontRef idx="minor">
-                <a:schemeClr val="lt1"/>
-              </a:fontRef>
-            </p:style>
-            <p:txBody>
-              <a:bodyPr rtlCol="0" anchor="ctr"/>
-              <a:lstStyle/>
-              <a:p>
-                <a:pPr algn="ctr"/>
-                <a:r>
-                  <a:rPr lang="ko-KR" altLang="en-US" sz="1000" dirty="0"/>
-                  <a:t>설정</a:t>
-                </a:r>
-              </a:p>
-            </p:txBody>
-          </p:sp>
-          <p:sp>
-            <p:nvSpPr>
-              <p:cNvPr id="174" name="타원 173">
-                <a:extLst>
-                  <a:ext uri="{FF2B5EF4-FFF2-40B4-BE49-F238E27FC236}">
-                    <a16:creationId xmlns:a16="http://schemas.microsoft.com/office/drawing/2014/main" id="{ECB7BB7A-E6F4-4E24-9A66-D4BF7E4C10DD}"/>
-                  </a:ext>
-                </a:extLst>
-              </p:cNvPr>
-              <p:cNvSpPr/>
-              <p:nvPr/>
-            </p:nvSpPr>
-            <p:spPr>
-              <a:xfrm>
-                <a:off x="1055065" y="2470861"/>
-                <a:ext cx="817277" cy="467252"/>
-              </a:xfrm>
-              <a:prstGeom prst="ellipse">
-                <a:avLst/>
-              </a:prstGeom>
-            </p:spPr>
-            <p:style>
-              <a:lnRef idx="2">
-                <a:schemeClr val="accent1">
-                  <a:shade val="50000"/>
-                </a:schemeClr>
-              </a:lnRef>
-              <a:fillRef idx="1">
-                <a:schemeClr val="accent1"/>
-              </a:fillRef>
-              <a:effectRef idx="0">
-                <a:schemeClr val="accent1"/>
-              </a:effectRef>
-              <a:fontRef idx="minor">
-                <a:schemeClr val="lt1"/>
-              </a:fontRef>
-            </p:style>
-            <p:txBody>
-              <a:bodyPr rtlCol="0" anchor="ctr"/>
-              <a:lstStyle/>
-              <a:p>
-                <a:pPr algn="ctr"/>
-                <a:r>
-                  <a:rPr lang="ko-KR" altLang="en-US" sz="1000" dirty="0"/>
-                  <a:t>주관식</a:t>
-                </a:r>
-              </a:p>
-            </p:txBody>
-          </p:sp>
-        </p:grpSp>
-        <p:sp>
-          <p:nvSpPr>
-            <p:cNvPr id="175" name="타원 174">
-              <a:extLst>
-                <a:ext uri="{FF2B5EF4-FFF2-40B4-BE49-F238E27FC236}">
-                  <a16:creationId xmlns:a16="http://schemas.microsoft.com/office/drawing/2014/main" id="{D5B12138-BAA3-4A11-8359-FB9A1426E405}"/>
-                </a:ext>
-              </a:extLst>
-            </p:cNvPr>
-            <p:cNvSpPr/>
-            <p:nvPr/>
-          </p:nvSpPr>
-          <p:spPr>
-            <a:xfrm>
-              <a:off x="1034342" y="2776324"/>
-              <a:ext cx="817277" cy="506475"/>
-            </a:xfrm>
-            <a:prstGeom prst="ellipse">
-              <a:avLst/>
-            </a:prstGeom>
-          </p:spPr>
-          <p:style>
-            <a:lnRef idx="2">
-              <a:schemeClr val="accent1">
-                <a:shade val="50000"/>
-              </a:schemeClr>
-            </a:lnRef>
-            <a:fillRef idx="1">
-              <a:schemeClr val="accent1"/>
-            </a:fillRef>
-            <a:effectRef idx="0">
-              <a:schemeClr val="accent1"/>
-            </a:effectRef>
-            <a:fontRef idx="minor">
-              <a:schemeClr val="lt1"/>
-            </a:fontRef>
-          </p:style>
-          <p:txBody>
-            <a:bodyPr rtlCol="0" anchor="ctr"/>
-            <a:lstStyle/>
-            <a:p>
-              <a:pPr algn="ctr"/>
-              <a:r>
-                <a:rPr lang="en-US" altLang="ko-KR" sz="1000" dirty="0"/>
-                <a:t>QR</a:t>
-              </a:r>
-            </a:p>
-            <a:p>
-              <a:pPr algn="ctr"/>
-              <a:r>
-                <a:rPr lang="ko-KR" altLang="en-US" sz="1000" dirty="0"/>
-                <a:t>코드</a:t>
-              </a:r>
-            </a:p>
-          </p:txBody>
-        </p:sp>
-      </p:grpSp>
-      <p:grpSp>
-        <p:nvGrpSpPr>
-          <p:cNvPr id="157" name="그룹 156">
-            <a:extLst>
-              <a:ext uri="{FF2B5EF4-FFF2-40B4-BE49-F238E27FC236}">
-                <a16:creationId xmlns:a16="http://schemas.microsoft.com/office/drawing/2014/main" id="{082627BB-5167-4154-8510-6E0831BE3740}"/>
-              </a:ext>
-            </a:extLst>
-          </p:cNvPr>
-          <p:cNvGrpSpPr/>
-          <p:nvPr/>
-        </p:nvGrpSpPr>
-        <p:grpSpPr>
-          <a:xfrm>
-            <a:off x="6963182" y="2137767"/>
-            <a:ext cx="2951017" cy="4654561"/>
-            <a:chOff x="1004982" y="1111809"/>
-            <a:chExt cx="2951017" cy="4654561"/>
-          </a:xfrm>
-        </p:grpSpPr>
-        <p:sp>
-          <p:nvSpPr>
-            <p:cNvPr id="158" name="직사각형 157">
-              <a:extLst>
-                <a:ext uri="{FF2B5EF4-FFF2-40B4-BE49-F238E27FC236}">
-                  <a16:creationId xmlns:a16="http://schemas.microsoft.com/office/drawing/2014/main" id="{44C6A8F8-EC17-48F3-901B-B1E9257BC7A6}"/>
-                </a:ext>
-              </a:extLst>
-            </p:cNvPr>
-            <p:cNvSpPr/>
-            <p:nvPr/>
-          </p:nvSpPr>
-          <p:spPr>
-            <a:xfrm>
-              <a:off x="2072640" y="1111809"/>
-              <a:ext cx="1067658" cy="423634"/>
+              <a:off x="2152649" y="1092824"/>
+              <a:ext cx="1481027" cy="359940"/>
             </a:xfrm>
             <a:prstGeom prst="rect">
               <a:avLst/>
@@ -5819,302 +5559,7 @@
             <a:p>
               <a:pPr algn="ctr"/>
               <a:r>
-                <a:rPr lang="en-US" altLang="ko-KR"/>
-                <a:t>QR </a:t>
-              </a:r>
-              <a:r>
-                <a:rPr lang="ko-KR" altLang="en-US" dirty="0"/>
-                <a:t>코드</a:t>
-              </a:r>
-              <a:endParaRPr lang="en-US" altLang="ko-KR" dirty="0"/>
-            </a:p>
-          </p:txBody>
-        </p:sp>
-        <p:sp>
-          <p:nvSpPr>
-            <p:cNvPr id="159" name="직사각형 158">
-              <a:extLst>
-                <a:ext uri="{FF2B5EF4-FFF2-40B4-BE49-F238E27FC236}">
-                  <a16:creationId xmlns:a16="http://schemas.microsoft.com/office/drawing/2014/main" id="{6C879087-6758-46F6-A71C-325E4A3A6B62}"/>
-                </a:ext>
-              </a:extLst>
-            </p:cNvPr>
-            <p:cNvSpPr/>
-            <p:nvPr/>
-          </p:nvSpPr>
-          <p:spPr>
-            <a:xfrm>
-              <a:off x="1004982" y="1111809"/>
-              <a:ext cx="1067658" cy="423634"/>
-            </a:xfrm>
-            <a:prstGeom prst="rect">
-              <a:avLst/>
-            </a:prstGeom>
-            <a:solidFill>
-              <a:schemeClr val="bg1">
-                <a:lumMod val="85000"/>
-              </a:schemeClr>
-            </a:solidFill>
-            <a:ln>
-              <a:noFill/>
-            </a:ln>
-          </p:spPr>
-          <p:style>
-            <a:lnRef idx="1">
-              <a:schemeClr val="accent3"/>
-            </a:lnRef>
-            <a:fillRef idx="2">
-              <a:schemeClr val="accent3"/>
-            </a:fillRef>
-            <a:effectRef idx="1">
-              <a:schemeClr val="accent3"/>
-            </a:effectRef>
-            <a:fontRef idx="minor">
-              <a:schemeClr val="dk1"/>
-            </a:fontRef>
-          </p:style>
-          <p:txBody>
-            <a:bodyPr rtlCol="0" anchor="ctr" anchorCtr="0"/>
-            <a:lstStyle/>
-            <a:p>
-              <a:pPr algn="ctr"/>
-              <a:r>
                 <a:rPr lang="en-US" altLang="ko-KR" dirty="0"/>
-                <a:t>AR </a:t>
-              </a:r>
-              <a:r>
-                <a:rPr lang="ko-KR" altLang="en-US" dirty="0"/>
-                <a:t>화면</a:t>
-              </a:r>
-              <a:endParaRPr lang="en-US" altLang="ko-KR" dirty="0"/>
-            </a:p>
-          </p:txBody>
-        </p:sp>
-        <p:sp>
-          <p:nvSpPr>
-            <p:cNvPr id="160" name="직사각형 159">
-              <a:extLst>
-                <a:ext uri="{FF2B5EF4-FFF2-40B4-BE49-F238E27FC236}">
-                  <a16:creationId xmlns:a16="http://schemas.microsoft.com/office/drawing/2014/main" id="{B39179AC-AD7F-47B0-B12D-0A7175ACDB39}"/>
-                </a:ext>
-              </a:extLst>
-            </p:cNvPr>
-            <p:cNvSpPr/>
-            <p:nvPr/>
-          </p:nvSpPr>
-          <p:spPr>
-            <a:xfrm>
-              <a:off x="1006537" y="1471749"/>
-              <a:ext cx="2949462" cy="4294621"/>
-            </a:xfrm>
-            <a:prstGeom prst="rect">
-              <a:avLst/>
-            </a:prstGeom>
-            <a:solidFill>
-              <a:schemeClr val="bg1">
-                <a:lumMod val="95000"/>
-              </a:schemeClr>
-            </a:solidFill>
-            <a:ln>
-              <a:noFill/>
-            </a:ln>
-          </p:spPr>
-          <p:style>
-            <a:lnRef idx="1">
-              <a:schemeClr val="accent3"/>
-            </a:lnRef>
-            <a:fillRef idx="2">
-              <a:schemeClr val="accent3"/>
-            </a:fillRef>
-            <a:effectRef idx="1">
-              <a:schemeClr val="accent3"/>
-            </a:effectRef>
-            <a:fontRef idx="minor">
-              <a:schemeClr val="dk1"/>
-            </a:fontRef>
-          </p:style>
-          <p:txBody>
-            <a:bodyPr rtlCol="0" anchor="ctr" anchorCtr="0"/>
-            <a:lstStyle/>
-            <a:p>
-              <a:pPr algn="ctr"/>
-              <a:r>
-                <a:rPr lang="ko-KR" altLang="en-US"/>
-                <a:t>주관식 창</a:t>
-              </a:r>
-              <a:endParaRPr lang="en-US" altLang="ko-KR" dirty="0"/>
-            </a:p>
-          </p:txBody>
-        </p:sp>
-        <p:sp>
-          <p:nvSpPr>
-            <p:cNvPr id="161" name="타원 160">
-              <a:extLst>
-                <a:ext uri="{FF2B5EF4-FFF2-40B4-BE49-F238E27FC236}">
-                  <a16:creationId xmlns:a16="http://schemas.microsoft.com/office/drawing/2014/main" id="{79B0961E-5927-419E-96DA-C7507E36399A}"/>
-                </a:ext>
-              </a:extLst>
-            </p:cNvPr>
-            <p:cNvSpPr/>
-            <p:nvPr/>
-          </p:nvSpPr>
-          <p:spPr>
-            <a:xfrm>
-              <a:off x="1145997" y="1883015"/>
-              <a:ext cx="635412" cy="467252"/>
-            </a:xfrm>
-            <a:prstGeom prst="ellipse">
-              <a:avLst/>
-            </a:prstGeom>
-          </p:spPr>
-          <p:style>
-            <a:lnRef idx="2">
-              <a:schemeClr val="accent1">
-                <a:shade val="50000"/>
-              </a:schemeClr>
-            </a:lnRef>
-            <a:fillRef idx="1">
-              <a:schemeClr val="accent1"/>
-            </a:fillRef>
-            <a:effectRef idx="0">
-              <a:schemeClr val="accent1"/>
-            </a:effectRef>
-            <a:fontRef idx="minor">
-              <a:schemeClr val="lt1"/>
-            </a:fontRef>
-          </p:style>
-          <p:txBody>
-            <a:bodyPr rtlCol="0" anchor="ctr"/>
-            <a:lstStyle/>
-            <a:p>
-              <a:pPr algn="ctr"/>
-              <a:r>
-                <a:rPr lang="ko-KR" altLang="en-US" sz="1000" dirty="0"/>
-                <a:t>설정</a:t>
-              </a:r>
-            </a:p>
-          </p:txBody>
-        </p:sp>
-        <p:sp>
-          <p:nvSpPr>
-            <p:cNvPr id="162" name="타원 161">
-              <a:extLst>
-                <a:ext uri="{FF2B5EF4-FFF2-40B4-BE49-F238E27FC236}">
-                  <a16:creationId xmlns:a16="http://schemas.microsoft.com/office/drawing/2014/main" id="{E7A4698E-2DBA-4B1F-9618-A98AC19783D9}"/>
-                </a:ext>
-              </a:extLst>
-            </p:cNvPr>
-            <p:cNvSpPr/>
-            <p:nvPr/>
-          </p:nvSpPr>
-          <p:spPr>
-            <a:xfrm>
-              <a:off x="1055065" y="2470861"/>
-              <a:ext cx="817277" cy="467252"/>
-            </a:xfrm>
-            <a:prstGeom prst="ellipse">
-              <a:avLst/>
-            </a:prstGeom>
-          </p:spPr>
-          <p:style>
-            <a:lnRef idx="2">
-              <a:schemeClr val="accent1">
-                <a:shade val="50000"/>
-              </a:schemeClr>
-            </a:lnRef>
-            <a:fillRef idx="1">
-              <a:schemeClr val="accent1"/>
-            </a:fillRef>
-            <a:effectRef idx="0">
-              <a:schemeClr val="accent1"/>
-            </a:effectRef>
-            <a:fontRef idx="minor">
-              <a:schemeClr val="lt1"/>
-            </a:fontRef>
-          </p:style>
-          <p:txBody>
-            <a:bodyPr rtlCol="0" anchor="ctr"/>
-            <a:lstStyle/>
-            <a:p>
-              <a:pPr algn="ctr"/>
-              <a:r>
-                <a:rPr lang="ko-KR" altLang="en-US" sz="1000" dirty="0"/>
-                <a:t>주관식</a:t>
-              </a:r>
-            </a:p>
-          </p:txBody>
-        </p:sp>
-      </p:grpSp>
-      <p:grpSp>
-        <p:nvGrpSpPr>
-          <p:cNvPr id="156" name="그룹 155">
-            <a:extLst>
-              <a:ext uri="{FF2B5EF4-FFF2-40B4-BE49-F238E27FC236}">
-                <a16:creationId xmlns:a16="http://schemas.microsoft.com/office/drawing/2014/main" id="{3C0E1063-EF28-4AEA-A75B-A137CD429A16}"/>
-              </a:ext>
-            </a:extLst>
-          </p:cNvPr>
-          <p:cNvGrpSpPr/>
-          <p:nvPr/>
-        </p:nvGrpSpPr>
-        <p:grpSpPr>
-          <a:xfrm>
-            <a:off x="9071915" y="2126660"/>
-            <a:ext cx="2951017" cy="4654561"/>
-            <a:chOff x="1004982" y="1111809"/>
-            <a:chExt cx="2951017" cy="4654561"/>
-          </a:xfrm>
-        </p:grpSpPr>
-        <p:sp>
-          <p:nvSpPr>
-            <p:cNvPr id="155" name="직사각형 154">
-              <a:extLst>
-                <a:ext uri="{FF2B5EF4-FFF2-40B4-BE49-F238E27FC236}">
-                  <a16:creationId xmlns:a16="http://schemas.microsoft.com/office/drawing/2014/main" id="{B2F6E63F-8D35-4BB6-933E-A0E982AB85BD}"/>
-                </a:ext>
-              </a:extLst>
-            </p:cNvPr>
-            <p:cNvSpPr/>
-            <p:nvPr/>
-          </p:nvSpPr>
-          <p:spPr>
-            <a:xfrm>
-              <a:off x="2072640" y="1111809"/>
-              <a:ext cx="1067658" cy="423634"/>
-            </a:xfrm>
-            <a:prstGeom prst="rect">
-              <a:avLst/>
-            </a:prstGeom>
-            <a:solidFill>
-              <a:schemeClr val="bg1">
-                <a:lumMod val="65000"/>
-              </a:schemeClr>
-            </a:solidFill>
-            <a:ln>
-              <a:noFill/>
-            </a:ln>
-          </p:spPr>
-          <p:style>
-            <a:lnRef idx="1">
-              <a:schemeClr val="accent3"/>
-            </a:lnRef>
-            <a:fillRef idx="2">
-              <a:schemeClr val="accent3"/>
-            </a:fillRef>
-            <a:effectRef idx="1">
-              <a:schemeClr val="accent3"/>
-            </a:effectRef>
-            <a:fontRef idx="minor">
-              <a:schemeClr val="dk1"/>
-            </a:fontRef>
-          </p:style>
-          <p:txBody>
-            <a:bodyPr rtlCol="0" anchor="ctr" anchorCtr="0"/>
-            <a:lstStyle/>
-            <a:p>
-              <a:pPr algn="ctr"/>
-              <a:r>
-                <a:rPr lang="en-US" altLang="ko-KR"/>
                 <a:t>QR </a:t>
               </a:r>
               <a:r>
@@ -6139,8 +5584,8 @@
           </p:nvSpPr>
           <p:spPr>
             <a:xfrm>
-              <a:off x="1004982" y="1111809"/>
-              <a:ext cx="1067658" cy="423634"/>
+              <a:off x="684212" y="1092824"/>
+              <a:ext cx="1468437" cy="359940"/>
             </a:xfrm>
             <a:prstGeom prst="rect">
               <a:avLst/>
@@ -6199,7 +5644,7 @@
           </p:nvSpPr>
           <p:spPr>
             <a:xfrm>
-              <a:off x="1006537" y="1471749"/>
+              <a:off x="689021" y="1452764"/>
               <a:ext cx="2949462" cy="4294621"/>
             </a:xfrm>
             <a:prstGeom prst="rect">
@@ -6245,104 +5690,6 @@
             </a:p>
           </p:txBody>
         </p:sp>
-        <p:sp>
-          <p:nvSpPr>
-            <p:cNvPr id="152" name="타원 151">
-              <a:extLst>
-                <a:ext uri="{FF2B5EF4-FFF2-40B4-BE49-F238E27FC236}">
-                  <a16:creationId xmlns:a16="http://schemas.microsoft.com/office/drawing/2014/main" id="{C2D81988-C654-4F7A-A601-65C55D4F0498}"/>
-                </a:ext>
-              </a:extLst>
-            </p:cNvPr>
-            <p:cNvSpPr/>
-            <p:nvPr/>
-          </p:nvSpPr>
-          <p:spPr>
-            <a:xfrm>
-              <a:off x="1145997" y="1883015"/>
-              <a:ext cx="635412" cy="467252"/>
-            </a:xfrm>
-            <a:prstGeom prst="ellipse">
-              <a:avLst/>
-            </a:prstGeom>
-          </p:spPr>
-          <p:style>
-            <a:lnRef idx="2">
-              <a:schemeClr val="accent1">
-                <a:shade val="50000"/>
-              </a:schemeClr>
-            </a:lnRef>
-            <a:fillRef idx="1">
-              <a:schemeClr val="accent1"/>
-            </a:fillRef>
-            <a:effectRef idx="0">
-              <a:schemeClr val="accent1"/>
-            </a:effectRef>
-            <a:fontRef idx="minor">
-              <a:schemeClr val="lt1"/>
-            </a:fontRef>
-          </p:style>
-          <p:txBody>
-            <a:bodyPr rtlCol="0" anchor="ctr"/>
-            <a:lstStyle/>
-            <a:p>
-              <a:pPr algn="ctr"/>
-              <a:r>
-                <a:rPr lang="ko-KR" altLang="en-US" sz="1000" dirty="0"/>
-                <a:t>설정</a:t>
-              </a:r>
-            </a:p>
-          </p:txBody>
-        </p:sp>
-        <p:sp>
-          <p:nvSpPr>
-            <p:cNvPr id="154" name="타원 153">
-              <a:extLst>
-                <a:ext uri="{FF2B5EF4-FFF2-40B4-BE49-F238E27FC236}">
-                  <a16:creationId xmlns:a16="http://schemas.microsoft.com/office/drawing/2014/main" id="{74C36AD7-C793-4A42-A002-62ECB67519DA}"/>
-                </a:ext>
-              </a:extLst>
-            </p:cNvPr>
-            <p:cNvSpPr/>
-            <p:nvPr/>
-          </p:nvSpPr>
-          <p:spPr>
-            <a:xfrm>
-              <a:off x="1055065" y="2470861"/>
-              <a:ext cx="817277" cy="467252"/>
-            </a:xfrm>
-            <a:prstGeom prst="ellipse">
-              <a:avLst/>
-            </a:prstGeom>
-          </p:spPr>
-          <p:style>
-            <a:lnRef idx="2">
-              <a:schemeClr val="accent1">
-                <a:shade val="50000"/>
-              </a:schemeClr>
-            </a:lnRef>
-            <a:fillRef idx="1">
-              <a:schemeClr val="accent1"/>
-            </a:fillRef>
-            <a:effectRef idx="0">
-              <a:schemeClr val="accent1"/>
-            </a:effectRef>
-            <a:fontRef idx="minor">
-              <a:schemeClr val="lt1"/>
-            </a:fontRef>
-          </p:style>
-          <p:txBody>
-            <a:bodyPr rtlCol="0" anchor="ctr"/>
-            <a:lstStyle/>
-            <a:p>
-              <a:pPr algn="ctr"/>
-              <a:r>
-                <a:rPr lang="ko-KR" altLang="en-US" sz="1000" dirty="0"/>
-                <a:t>주관식</a:t>
-              </a:r>
-            </a:p>
-          </p:txBody>
-        </p:sp>
       </p:grpSp>
       <p:sp>
         <p:nvSpPr>
@@ -6358,7 +5705,7 @@
         </p:nvSpPr>
         <p:spPr>
           <a:xfrm>
-            <a:off x="1004982" y="1118122"/>
+            <a:off x="684213" y="1092258"/>
             <a:ext cx="2951017" cy="4655127"/>
           </a:xfrm>
           <a:prstGeom prst="rect">
@@ -6410,8 +5757,8 @@
         </p:nvSpPr>
         <p:spPr>
           <a:xfrm>
-            <a:off x="1715747" y="461947"/>
-            <a:ext cx="1420582" cy="369332"/>
+            <a:off x="7695142" y="190697"/>
+            <a:ext cx="1189749" cy="369332"/>
           </a:xfrm>
           <a:prstGeom prst="rect">
             <a:avLst/>
@@ -6426,7 +5773,7 @@
           <a:p>
             <a:r>
               <a:rPr lang="ko-KR" altLang="en-US" dirty="0"/>
-              <a:t>실시간 랭킹</a:t>
+              <a:t>메인 메뉴</a:t>
             </a:r>
           </a:p>
         </p:txBody>
@@ -6445,7 +5792,7 @@
         </p:nvGrpSpPr>
         <p:grpSpPr>
           <a:xfrm>
-            <a:off x="8513322" y="304594"/>
+            <a:off x="7561564" y="938137"/>
             <a:ext cx="1978169" cy="2201138"/>
             <a:chOff x="2960543" y="2767444"/>
             <a:chExt cx="1978169" cy="2201138"/>
@@ -6595,6 +5942,125 @@
               <a:r>
                 <a:rPr lang="ko-KR" altLang="en-US" dirty="0"/>
                 <a:t>역대 기록 버튼</a:t>
+              </a:r>
+              <a:endParaRPr lang="en-US" altLang="ko-KR" dirty="0"/>
+            </a:p>
+          </p:txBody>
+        </p:sp>
+      </p:grpSp>
+      <p:grpSp>
+        <p:nvGrpSpPr>
+          <p:cNvPr id="128" name="그룹 127">
+            <a:extLst>
+              <a:ext uri="{FF2B5EF4-FFF2-40B4-BE49-F238E27FC236}">
+                <a16:creationId xmlns:a16="http://schemas.microsoft.com/office/drawing/2014/main" id="{44DB481A-101A-4349-A1F0-B0D57AB4E857}"/>
+              </a:ext>
+            </a:extLst>
+          </p:cNvPr>
+          <p:cNvGrpSpPr/>
+          <p:nvPr/>
+        </p:nvGrpSpPr>
+        <p:grpSpPr>
+          <a:xfrm>
+            <a:off x="6334448" y="4185632"/>
+            <a:ext cx="2930400" cy="2376477"/>
+            <a:chOff x="4487829" y="2378316"/>
+            <a:chExt cx="2494312" cy="2663072"/>
+          </a:xfrm>
+        </p:grpSpPr>
+        <p:sp>
+          <p:nvSpPr>
+            <p:cNvPr id="126" name="직사각형 125">
+              <a:extLst>
+                <a:ext uri="{FF2B5EF4-FFF2-40B4-BE49-F238E27FC236}">
+                  <a16:creationId xmlns:a16="http://schemas.microsoft.com/office/drawing/2014/main" id="{34AC872F-BC83-4CE2-BA11-9B7705F493FD}"/>
+                </a:ext>
+              </a:extLst>
+            </p:cNvPr>
+            <p:cNvSpPr/>
+            <p:nvPr/>
+          </p:nvSpPr>
+          <p:spPr>
+            <a:xfrm>
+              <a:off x="4487829" y="2378316"/>
+              <a:ext cx="2494312" cy="1331537"/>
+            </a:xfrm>
+            <a:prstGeom prst="rect">
+              <a:avLst/>
+            </a:prstGeom>
+            <a:ln/>
+          </p:spPr>
+          <p:style>
+            <a:lnRef idx="1">
+              <a:schemeClr val="accent3"/>
+            </a:lnRef>
+            <a:fillRef idx="2">
+              <a:schemeClr val="accent3"/>
+            </a:fillRef>
+            <a:effectRef idx="1">
+              <a:schemeClr val="accent3"/>
+            </a:effectRef>
+            <a:fontRef idx="minor">
+              <a:schemeClr val="dk1"/>
+            </a:fontRef>
+          </p:style>
+          <p:txBody>
+            <a:bodyPr rtlCol="0" anchor="ctr" anchorCtr="0"/>
+            <a:lstStyle/>
+            <a:p>
+              <a:pPr algn="ctr"/>
+              <a:r>
+                <a:rPr lang="ko-KR" altLang="en-US" dirty="0"/>
+                <a:t>새내기 대회</a:t>
+              </a:r>
+              <a:endParaRPr lang="en-US" altLang="ko-KR" dirty="0"/>
+            </a:p>
+          </p:txBody>
+        </p:sp>
+        <p:sp>
+          <p:nvSpPr>
+            <p:cNvPr id="127" name="직사각형 126">
+              <a:extLst>
+                <a:ext uri="{FF2B5EF4-FFF2-40B4-BE49-F238E27FC236}">
+                  <a16:creationId xmlns:a16="http://schemas.microsoft.com/office/drawing/2014/main" id="{6AFEF97F-925B-4AEC-ADEC-ECD8A1BD27EC}"/>
+                </a:ext>
+              </a:extLst>
+            </p:cNvPr>
+            <p:cNvSpPr/>
+            <p:nvPr/>
+          </p:nvSpPr>
+          <p:spPr>
+            <a:xfrm>
+              <a:off x="4487829" y="3709852"/>
+              <a:ext cx="2494312" cy="1331536"/>
+            </a:xfrm>
+            <a:prstGeom prst="rect">
+              <a:avLst/>
+            </a:prstGeom>
+            <a:ln/>
+          </p:spPr>
+          <p:style>
+            <a:lnRef idx="1">
+              <a:schemeClr val="accent3"/>
+            </a:lnRef>
+            <a:fillRef idx="2">
+              <a:schemeClr val="accent3"/>
+            </a:fillRef>
+            <a:effectRef idx="1">
+              <a:schemeClr val="accent3"/>
+            </a:effectRef>
+            <a:fontRef idx="minor">
+              <a:schemeClr val="dk1"/>
+            </a:fontRef>
+          </p:style>
+          <p:txBody>
+            <a:bodyPr rtlCol="0" anchor="ctr" anchorCtr="0"/>
+            <a:lstStyle/>
+            <a:p>
+              <a:pPr algn="ctr"/>
+              <a:r>
+                <a:rPr lang="ko-KR" altLang="en-US" dirty="0"/>
+                <a:t>상시 대회</a:t>
               </a:r>
               <a:endParaRPr lang="en-US" altLang="ko-KR" dirty="0"/>
             </a:p>
@@ -7807,181 +7273,41 @@
           </p:txBody>
         </p:sp>
       </p:grpSp>
-      <p:grpSp>
-        <p:nvGrpSpPr>
-          <p:cNvPr id="146" name="그룹 145">
+      <p:sp>
+        <p:nvSpPr>
+          <p:cNvPr id="145" name="TextBox 144">
             <a:extLst>
               <a:ext uri="{FF2B5EF4-FFF2-40B4-BE49-F238E27FC236}">
-                <a16:creationId xmlns:a16="http://schemas.microsoft.com/office/drawing/2014/main" id="{BB46384A-24A9-47C4-A58F-514B81F6E22D}"/>
+                <a16:creationId xmlns:a16="http://schemas.microsoft.com/office/drawing/2014/main" id="{A06A7710-853D-4B13-9DA6-138AEF315F48}"/>
               </a:ext>
             </a:extLst>
           </p:cNvPr>
-          <p:cNvGrpSpPr/>
+          <p:cNvSpPr txBox="1"/>
           <p:nvPr/>
-        </p:nvGrpSpPr>
-        <p:grpSpPr>
+        </p:nvSpPr>
+        <p:spPr>
           <a:xfrm>
-            <a:off x="8377948" y="70091"/>
-            <a:ext cx="2494312" cy="3131643"/>
-            <a:chOff x="4088270" y="2641606"/>
-            <a:chExt cx="2494312" cy="3131643"/>
+            <a:off x="3407287" y="26483"/>
+            <a:ext cx="1189749" cy="369332"/>
           </a:xfrm>
-        </p:grpSpPr>
-        <p:grpSp>
-          <p:nvGrpSpPr>
-            <p:cNvPr id="128" name="그룹 127">
-              <a:extLst>
-                <a:ext uri="{FF2B5EF4-FFF2-40B4-BE49-F238E27FC236}">
-                  <a16:creationId xmlns:a16="http://schemas.microsoft.com/office/drawing/2014/main" id="{44DB481A-101A-4349-A1F0-B0D57AB4E857}"/>
-                </a:ext>
-              </a:extLst>
-            </p:cNvPr>
-            <p:cNvGrpSpPr/>
-            <p:nvPr/>
-          </p:nvGrpSpPr>
-          <p:grpSpPr>
-            <a:xfrm>
-              <a:off x="4088270" y="3110177"/>
-              <a:ext cx="2494312" cy="2663072"/>
-              <a:chOff x="4487829" y="2378316"/>
-              <a:chExt cx="2494312" cy="2663072"/>
-            </a:xfrm>
-          </p:grpSpPr>
-          <p:sp>
-            <p:nvSpPr>
-              <p:cNvPr id="126" name="직사각형 125">
-                <a:extLst>
-                  <a:ext uri="{FF2B5EF4-FFF2-40B4-BE49-F238E27FC236}">
-                    <a16:creationId xmlns:a16="http://schemas.microsoft.com/office/drawing/2014/main" id="{34AC872F-BC83-4CE2-BA11-9B7705F493FD}"/>
-                  </a:ext>
-                </a:extLst>
-              </p:cNvPr>
-              <p:cNvSpPr/>
-              <p:nvPr/>
-            </p:nvSpPr>
-            <p:spPr>
-              <a:xfrm>
-                <a:off x="4487829" y="2378316"/>
-                <a:ext cx="2494312" cy="1331536"/>
-              </a:xfrm>
-              <a:prstGeom prst="rect">
-                <a:avLst/>
-              </a:prstGeom>
-              <a:ln/>
-            </p:spPr>
-            <p:style>
-              <a:lnRef idx="1">
-                <a:schemeClr val="accent3"/>
-              </a:lnRef>
-              <a:fillRef idx="2">
-                <a:schemeClr val="accent3"/>
-              </a:fillRef>
-              <a:effectRef idx="1">
-                <a:schemeClr val="accent3"/>
-              </a:effectRef>
-              <a:fontRef idx="minor">
-                <a:schemeClr val="dk1"/>
-              </a:fontRef>
-            </p:style>
-            <p:txBody>
-              <a:bodyPr rtlCol="0" anchor="ctr" anchorCtr="0"/>
-              <a:lstStyle/>
-              <a:p>
-                <a:pPr algn="ctr"/>
-                <a:r>
-                  <a:rPr lang="ko-KR" altLang="en-US" dirty="0"/>
-                  <a:t>새내기 대회</a:t>
-                </a:r>
-                <a:endParaRPr lang="en-US" altLang="ko-KR" dirty="0"/>
-              </a:p>
-            </p:txBody>
-          </p:sp>
-          <p:sp>
-            <p:nvSpPr>
-              <p:cNvPr id="127" name="직사각형 126">
-                <a:extLst>
-                  <a:ext uri="{FF2B5EF4-FFF2-40B4-BE49-F238E27FC236}">
-                    <a16:creationId xmlns:a16="http://schemas.microsoft.com/office/drawing/2014/main" id="{6AFEF97F-925B-4AEC-ADEC-ECD8A1BD27EC}"/>
-                  </a:ext>
-                </a:extLst>
-              </p:cNvPr>
-              <p:cNvSpPr/>
-              <p:nvPr/>
-            </p:nvSpPr>
-            <p:spPr>
-              <a:xfrm>
-                <a:off x="4487829" y="3709852"/>
-                <a:ext cx="2494312" cy="1331536"/>
-              </a:xfrm>
-              <a:prstGeom prst="rect">
-                <a:avLst/>
-              </a:prstGeom>
-              <a:ln/>
-            </p:spPr>
-            <p:style>
-              <a:lnRef idx="1">
-                <a:schemeClr val="accent3"/>
-              </a:lnRef>
-              <a:fillRef idx="2">
-                <a:schemeClr val="accent3"/>
-              </a:fillRef>
-              <a:effectRef idx="1">
-                <a:schemeClr val="accent3"/>
-              </a:effectRef>
-              <a:fontRef idx="minor">
-                <a:schemeClr val="dk1"/>
-              </a:fontRef>
-            </p:style>
-            <p:txBody>
-              <a:bodyPr rtlCol="0" anchor="ctr" anchorCtr="0"/>
-              <a:lstStyle/>
-              <a:p>
-                <a:pPr algn="ctr"/>
-                <a:r>
-                  <a:rPr lang="ko-KR" altLang="en-US" dirty="0"/>
-                  <a:t>상시 대회</a:t>
-                </a:r>
-                <a:endParaRPr lang="en-US" altLang="ko-KR" dirty="0"/>
-              </a:p>
-            </p:txBody>
-          </p:sp>
-        </p:grpSp>
-        <p:sp>
-          <p:nvSpPr>
-            <p:cNvPr id="145" name="TextBox 144">
-              <a:extLst>
-                <a:ext uri="{FF2B5EF4-FFF2-40B4-BE49-F238E27FC236}">
-                  <a16:creationId xmlns:a16="http://schemas.microsoft.com/office/drawing/2014/main" id="{A06A7710-853D-4B13-9DA6-138AEF315F48}"/>
-                </a:ext>
-              </a:extLst>
-            </p:cNvPr>
-            <p:cNvSpPr txBox="1"/>
-            <p:nvPr/>
-          </p:nvSpPr>
-          <p:spPr>
-            <a:xfrm>
-              <a:off x="4740551" y="2641606"/>
-              <a:ext cx="1189749" cy="369332"/>
-            </a:xfrm>
-            <a:prstGeom prst="rect">
-              <a:avLst/>
-            </a:prstGeom>
-            <a:noFill/>
-          </p:spPr>
-          <p:txBody>
-            <a:bodyPr wrap="none" rtlCol="0">
-              <a:spAutoFit/>
-            </a:bodyPr>
-            <a:lstStyle/>
-            <a:p>
-              <a:r>
-                <a:rPr lang="ko-KR" altLang="en-US" dirty="0"/>
-                <a:t>대회 목록</a:t>
-              </a:r>
-            </a:p>
-          </p:txBody>
-        </p:sp>
-      </p:grpSp>
+          <a:prstGeom prst="rect">
+            <a:avLst/>
+          </a:prstGeom>
+          <a:noFill/>
+        </p:spPr>
+        <p:txBody>
+          <a:bodyPr wrap="none" rtlCol="0">
+            <a:spAutoFit/>
+          </a:bodyPr>
+          <a:lstStyle/>
+          <a:p>
+            <a:r>
+              <a:rPr lang="ko-KR" altLang="en-US" dirty="0"/>
+              <a:t>대회 목록</a:t>
+            </a:r>
+          </a:p>
+        </p:txBody>
+      </p:sp>
       <p:grpSp>
         <p:nvGrpSpPr>
           <p:cNvPr id="135" name="그룹 134">
@@ -7996,8 +7322,8 @@
         </p:nvGrpSpPr>
         <p:grpSpPr>
           <a:xfrm>
-            <a:off x="8320059" y="59884"/>
-            <a:ext cx="2494312" cy="3132238"/>
+            <a:off x="7487718" y="3689126"/>
+            <a:ext cx="2952571" cy="3132238"/>
             <a:chOff x="6910641" y="2641011"/>
             <a:chExt cx="2494312" cy="3132238"/>
           </a:xfrm>
@@ -8036,8 +7362,8 @@
             </p:nvSpPr>
             <p:spPr>
               <a:xfrm>
-                <a:off x="4487829" y="2378316"/>
-                <a:ext cx="2494312" cy="1331536"/>
+                <a:off x="4487830" y="2378316"/>
+                <a:ext cx="2491686" cy="1331536"/>
               </a:xfrm>
               <a:prstGeom prst="rect">
                 <a:avLst/>
@@ -8774,6 +8100,678 @@
           </p:txBody>
         </p:sp>
       </p:grpSp>
+      <p:sp>
+        <p:nvSpPr>
+          <p:cNvPr id="2" name="직사각형 1">
+            <a:extLst>
+              <a:ext uri="{FF2B5EF4-FFF2-40B4-BE49-F238E27FC236}">
+                <a16:creationId xmlns:a16="http://schemas.microsoft.com/office/drawing/2014/main" id="{E25CEA98-4A32-49C3-AF09-E26EAC6B1C6C}"/>
+              </a:ext>
+            </a:extLst>
+          </p:cNvPr>
+          <p:cNvSpPr/>
+          <p:nvPr/>
+        </p:nvSpPr>
+        <p:spPr>
+          <a:xfrm>
+            <a:off x="414668" y="299725"/>
+            <a:ext cx="2951017" cy="530121"/>
+          </a:xfrm>
+          <a:prstGeom prst="rect">
+            <a:avLst/>
+          </a:prstGeom>
+        </p:spPr>
+        <p:style>
+          <a:lnRef idx="2">
+            <a:schemeClr val="accent3">
+              <a:shade val="50000"/>
+            </a:schemeClr>
+          </a:lnRef>
+          <a:fillRef idx="1">
+            <a:schemeClr val="accent3"/>
+          </a:fillRef>
+          <a:effectRef idx="0">
+            <a:schemeClr val="accent3"/>
+          </a:effectRef>
+          <a:fontRef idx="minor">
+            <a:schemeClr val="lt1"/>
+          </a:fontRef>
+        </p:style>
+        <p:txBody>
+          <a:bodyPr rtlCol="0" anchor="ctr"/>
+          <a:lstStyle/>
+          <a:p>
+            <a:pPr algn="ctr"/>
+            <a:r>
+              <a:rPr lang="ko-KR" altLang="en-US" dirty="0"/>
+              <a:t>상시 대회 목록</a:t>
+            </a:r>
+          </a:p>
+        </p:txBody>
+      </p:sp>
+      <p:grpSp>
+        <p:nvGrpSpPr>
+          <p:cNvPr id="20" name="그룹 19">
+            <a:extLst>
+              <a:ext uri="{FF2B5EF4-FFF2-40B4-BE49-F238E27FC236}">
+                <a16:creationId xmlns:a16="http://schemas.microsoft.com/office/drawing/2014/main" id="{188908DF-39B3-4988-AE80-893476791ECE}"/>
+              </a:ext>
+            </a:extLst>
+          </p:cNvPr>
+          <p:cNvGrpSpPr/>
+          <p:nvPr/>
+        </p:nvGrpSpPr>
+        <p:grpSpPr>
+          <a:xfrm>
+            <a:off x="10861910" y="3514778"/>
+            <a:ext cx="393566" cy="1408146"/>
+            <a:chOff x="853491" y="1228853"/>
+            <a:chExt cx="393566" cy="1408146"/>
+          </a:xfrm>
+        </p:grpSpPr>
+        <p:grpSp>
+          <p:nvGrpSpPr>
+            <p:cNvPr id="11" name="그룹 10">
+              <a:extLst>
+                <a:ext uri="{FF2B5EF4-FFF2-40B4-BE49-F238E27FC236}">
+                  <a16:creationId xmlns:a16="http://schemas.microsoft.com/office/drawing/2014/main" id="{890ECDCE-BB93-4061-BA85-3AE58F9473F7}"/>
+                </a:ext>
+              </a:extLst>
+            </p:cNvPr>
+            <p:cNvGrpSpPr/>
+            <p:nvPr/>
+          </p:nvGrpSpPr>
+          <p:grpSpPr>
+            <a:xfrm>
+              <a:off x="853491" y="1228853"/>
+              <a:ext cx="393566" cy="900856"/>
+              <a:chOff x="724523" y="1506167"/>
+              <a:chExt cx="393566" cy="900856"/>
+            </a:xfrm>
+          </p:grpSpPr>
+          <p:grpSp>
+            <p:nvGrpSpPr>
+              <p:cNvPr id="7" name="그룹 6">
+                <a:extLst>
+                  <a:ext uri="{FF2B5EF4-FFF2-40B4-BE49-F238E27FC236}">
+                    <a16:creationId xmlns:a16="http://schemas.microsoft.com/office/drawing/2014/main" id="{E17E7F37-BF39-41E2-B9CE-36247B5763DE}"/>
+                  </a:ext>
+                </a:extLst>
+              </p:cNvPr>
+              <p:cNvGrpSpPr/>
+              <p:nvPr/>
+            </p:nvGrpSpPr>
+            <p:grpSpPr>
+              <a:xfrm>
+                <a:off x="724523" y="1506167"/>
+                <a:ext cx="393566" cy="393566"/>
+                <a:chOff x="3429577" y="1676530"/>
+                <a:chExt cx="393566" cy="393566"/>
+              </a:xfrm>
+            </p:grpSpPr>
+            <p:sp>
+              <p:nvSpPr>
+                <p:cNvPr id="3" name="타원 2">
+                  <a:extLst>
+                    <a:ext uri="{FF2B5EF4-FFF2-40B4-BE49-F238E27FC236}">
+                      <a16:creationId xmlns:a16="http://schemas.microsoft.com/office/drawing/2014/main" id="{2C417D02-1DA1-4974-AF9D-DC8C1F08AD90}"/>
+                    </a:ext>
+                  </a:extLst>
+                </p:cNvPr>
+                <p:cNvSpPr/>
+                <p:nvPr/>
+              </p:nvSpPr>
+              <p:spPr>
+                <a:xfrm>
+                  <a:off x="3437629" y="1686069"/>
+                  <a:ext cx="369465" cy="369465"/>
+                </a:xfrm>
+                <a:prstGeom prst="ellipse">
+                  <a:avLst/>
+                </a:prstGeom>
+                <a:solidFill>
+                  <a:schemeClr val="bg1">
+                    <a:lumMod val="95000"/>
+                  </a:schemeClr>
+                </a:solidFill>
+                <a:ln>
+                  <a:noFill/>
+                </a:ln>
+              </p:spPr>
+              <p:style>
+                <a:lnRef idx="3">
+                  <a:schemeClr val="lt1"/>
+                </a:lnRef>
+                <a:fillRef idx="1">
+                  <a:schemeClr val="accent3"/>
+                </a:fillRef>
+                <a:effectRef idx="1">
+                  <a:schemeClr val="accent3"/>
+                </a:effectRef>
+                <a:fontRef idx="minor">
+                  <a:schemeClr val="lt1"/>
+                </a:fontRef>
+              </p:style>
+              <p:txBody>
+                <a:bodyPr rtlCol="0" anchor="ctr"/>
+                <a:lstStyle/>
+                <a:p>
+                  <a:pPr algn="ctr"/>
+                  <a:endParaRPr lang="ko-KR" altLang="en-US" sz="800" dirty="0"/>
+                </a:p>
+              </p:txBody>
+            </p:sp>
+            <p:pic>
+              <p:nvPicPr>
+                <p:cNvPr id="6" name="그래픽 5" descr="단일 톱니바퀴">
+                  <a:extLst>
+                    <a:ext uri="{FF2B5EF4-FFF2-40B4-BE49-F238E27FC236}">
+                      <a16:creationId xmlns:a16="http://schemas.microsoft.com/office/drawing/2014/main" id="{E172061E-8C3D-46E8-803E-1F3617BF7173}"/>
+                    </a:ext>
+                  </a:extLst>
+                </p:cNvPr>
+                <p:cNvPicPr>
+                  <a:picLocks noChangeAspect="1"/>
+                </p:cNvPicPr>
+                <p:nvPr/>
+              </p:nvPicPr>
+              <p:blipFill>
+                <a:blip r:embed="rId3">
+                  <a:extLst>
+                    <a:ext uri="{28A0092B-C50C-407E-A947-70E740481C1C}">
+                      <a14:useLocalDpi xmlns:a14="http://schemas.microsoft.com/office/drawing/2010/main" val="0"/>
+                    </a:ext>
+                    <a:ext uri="{96DAC541-7B7A-43D3-8B79-37D633B846F1}">
+                      <asvg:svgBlip xmlns:asvg="http://schemas.microsoft.com/office/drawing/2016/SVG/main" r:embed="rId4"/>
+                    </a:ext>
+                  </a:extLst>
+                </a:blip>
+                <a:stretch>
+                  <a:fillRect/>
+                </a:stretch>
+              </p:blipFill>
+              <p:spPr>
+                <a:xfrm>
+                  <a:off x="3429577" y="1676530"/>
+                  <a:ext cx="393566" cy="393566"/>
+                </a:xfrm>
+                <a:prstGeom prst="rect">
+                  <a:avLst/>
+                </a:prstGeom>
+              </p:spPr>
+            </p:pic>
+          </p:grpSp>
+          <p:grpSp>
+            <p:nvGrpSpPr>
+              <p:cNvPr id="10" name="그룹 9">
+                <a:extLst>
+                  <a:ext uri="{FF2B5EF4-FFF2-40B4-BE49-F238E27FC236}">
+                    <a16:creationId xmlns:a16="http://schemas.microsoft.com/office/drawing/2014/main" id="{DD7BFC9F-A8EC-4942-9481-34ABF84698B5}"/>
+                  </a:ext>
+                </a:extLst>
+              </p:cNvPr>
+              <p:cNvGrpSpPr/>
+              <p:nvPr/>
+            </p:nvGrpSpPr>
+            <p:grpSpPr>
+              <a:xfrm>
+                <a:off x="732575" y="2037558"/>
+                <a:ext cx="369465" cy="369465"/>
+                <a:chOff x="3900106" y="3218788"/>
+                <a:chExt cx="369465" cy="369465"/>
+              </a:xfrm>
+            </p:grpSpPr>
+            <p:sp>
+              <p:nvSpPr>
+                <p:cNvPr id="94" name="타원 93">
+                  <a:extLst>
+                    <a:ext uri="{FF2B5EF4-FFF2-40B4-BE49-F238E27FC236}">
+                      <a16:creationId xmlns:a16="http://schemas.microsoft.com/office/drawing/2014/main" id="{03DA23BC-7828-4A88-9775-7D88FC0FC1BA}"/>
+                    </a:ext>
+                  </a:extLst>
+                </p:cNvPr>
+                <p:cNvSpPr/>
+                <p:nvPr/>
+              </p:nvSpPr>
+              <p:spPr>
+                <a:xfrm>
+                  <a:off x="3900106" y="3218788"/>
+                  <a:ext cx="369465" cy="369465"/>
+                </a:xfrm>
+                <a:prstGeom prst="ellipse">
+                  <a:avLst/>
+                </a:prstGeom>
+                <a:solidFill>
+                  <a:schemeClr val="bg1">
+                    <a:lumMod val="95000"/>
+                  </a:schemeClr>
+                </a:solidFill>
+                <a:ln>
+                  <a:noFill/>
+                </a:ln>
+              </p:spPr>
+              <p:style>
+                <a:lnRef idx="3">
+                  <a:schemeClr val="lt1"/>
+                </a:lnRef>
+                <a:fillRef idx="1">
+                  <a:schemeClr val="accent3"/>
+                </a:fillRef>
+                <a:effectRef idx="1">
+                  <a:schemeClr val="accent3"/>
+                </a:effectRef>
+                <a:fontRef idx="minor">
+                  <a:schemeClr val="lt1"/>
+                </a:fontRef>
+              </p:style>
+              <p:txBody>
+                <a:bodyPr rtlCol="0" anchor="ctr"/>
+                <a:lstStyle/>
+                <a:p>
+                  <a:pPr algn="ctr"/>
+                  <a:endParaRPr lang="ko-KR" altLang="en-US" sz="800" dirty="0"/>
+                </a:p>
+              </p:txBody>
+            </p:sp>
+            <p:pic>
+              <p:nvPicPr>
+                <p:cNvPr id="9" name="그래픽 8" descr="RTL 목록">
+                  <a:extLst>
+                    <a:ext uri="{FF2B5EF4-FFF2-40B4-BE49-F238E27FC236}">
+                      <a16:creationId xmlns:a16="http://schemas.microsoft.com/office/drawing/2014/main" id="{88542E78-326E-459B-ABBB-21165E21F63C}"/>
+                    </a:ext>
+                  </a:extLst>
+                </p:cNvPr>
+                <p:cNvPicPr>
+                  <a:picLocks noChangeAspect="1"/>
+                </p:cNvPicPr>
+                <p:nvPr/>
+              </p:nvPicPr>
+              <p:blipFill>
+                <a:blip r:embed="rId5">
+                  <a:extLst>
+                    <a:ext uri="{28A0092B-C50C-407E-A947-70E740481C1C}">
+                      <a14:useLocalDpi xmlns:a14="http://schemas.microsoft.com/office/drawing/2010/main" val="0"/>
+                    </a:ext>
+                    <a:ext uri="{96DAC541-7B7A-43D3-8B79-37D633B846F1}">
+                      <asvg:svgBlip xmlns:asvg="http://schemas.microsoft.com/office/drawing/2016/SVG/main" r:embed="rId6"/>
+                    </a:ext>
+                  </a:extLst>
+                </a:blip>
+                <a:stretch>
+                  <a:fillRect/>
+                </a:stretch>
+              </p:blipFill>
+              <p:spPr>
+                <a:xfrm>
+                  <a:off x="3961360" y="3280041"/>
+                  <a:ext cx="246958" cy="246958"/>
+                </a:xfrm>
+                <a:prstGeom prst="rect">
+                  <a:avLst/>
+                </a:prstGeom>
+              </p:spPr>
+            </p:pic>
+          </p:grpSp>
+        </p:grpSp>
+        <p:grpSp>
+          <p:nvGrpSpPr>
+            <p:cNvPr id="19" name="그룹 18">
+              <a:extLst>
+                <a:ext uri="{FF2B5EF4-FFF2-40B4-BE49-F238E27FC236}">
+                  <a16:creationId xmlns:a16="http://schemas.microsoft.com/office/drawing/2014/main" id="{1F7F744F-E3E7-4BF2-B6BD-975F8B8F6884}"/>
+                </a:ext>
+              </a:extLst>
+            </p:cNvPr>
+            <p:cNvGrpSpPr/>
+            <p:nvPr/>
+          </p:nvGrpSpPr>
+          <p:grpSpPr>
+            <a:xfrm>
+              <a:off x="861543" y="2267534"/>
+              <a:ext cx="369465" cy="369465"/>
+              <a:chOff x="4033313" y="3561186"/>
+              <a:chExt cx="369465" cy="369465"/>
+            </a:xfrm>
+          </p:grpSpPr>
+          <p:sp>
+            <p:nvSpPr>
+              <p:cNvPr id="123" name="타원 122">
+                <a:extLst>
+                  <a:ext uri="{FF2B5EF4-FFF2-40B4-BE49-F238E27FC236}">
+                    <a16:creationId xmlns:a16="http://schemas.microsoft.com/office/drawing/2014/main" id="{F8142F1A-004F-4432-8C17-1F27F4B16594}"/>
+                  </a:ext>
+                </a:extLst>
+              </p:cNvPr>
+              <p:cNvSpPr/>
+              <p:nvPr/>
+            </p:nvSpPr>
+            <p:spPr>
+              <a:xfrm>
+                <a:off x="4033313" y="3561186"/>
+                <a:ext cx="369465" cy="369465"/>
+              </a:xfrm>
+              <a:prstGeom prst="ellipse">
+                <a:avLst/>
+              </a:prstGeom>
+              <a:solidFill>
+                <a:schemeClr val="bg1">
+                  <a:lumMod val="95000"/>
+                </a:schemeClr>
+              </a:solidFill>
+              <a:ln>
+                <a:noFill/>
+              </a:ln>
+            </p:spPr>
+            <p:style>
+              <a:lnRef idx="3">
+                <a:schemeClr val="lt1"/>
+              </a:lnRef>
+              <a:fillRef idx="1">
+                <a:schemeClr val="accent3"/>
+              </a:fillRef>
+              <a:effectRef idx="1">
+                <a:schemeClr val="accent3"/>
+              </a:effectRef>
+              <a:fontRef idx="minor">
+                <a:schemeClr val="lt1"/>
+              </a:fontRef>
+            </p:style>
+            <p:txBody>
+              <a:bodyPr rtlCol="0" anchor="ctr"/>
+              <a:lstStyle/>
+              <a:p>
+                <a:pPr algn="ctr"/>
+                <a:endParaRPr lang="ko-KR" altLang="en-US" sz="800" dirty="0"/>
+              </a:p>
+            </p:txBody>
+          </p:sp>
+          <p:pic>
+            <p:nvPicPr>
+              <p:cNvPr id="18" name="그래픽 17" descr="바코드">
+                <a:extLst>
+                  <a:ext uri="{FF2B5EF4-FFF2-40B4-BE49-F238E27FC236}">
+                    <a16:creationId xmlns:a16="http://schemas.microsoft.com/office/drawing/2014/main" id="{B22E59C9-586A-4757-8B68-F1F93213A6A8}"/>
+                  </a:ext>
+                </a:extLst>
+              </p:cNvPr>
+              <p:cNvPicPr>
+                <a:picLocks noChangeAspect="1"/>
+              </p:cNvPicPr>
+              <p:nvPr/>
+            </p:nvPicPr>
+            <p:blipFill>
+              <a:blip r:embed="rId7">
+                <a:extLst>
+                  <a:ext uri="{28A0092B-C50C-407E-A947-70E740481C1C}">
+                    <a14:useLocalDpi xmlns:a14="http://schemas.microsoft.com/office/drawing/2010/main" val="0"/>
+                  </a:ext>
+                  <a:ext uri="{96DAC541-7B7A-43D3-8B79-37D633B846F1}">
+                    <asvg:svgBlip xmlns:asvg="http://schemas.microsoft.com/office/drawing/2016/SVG/main" r:embed="rId8"/>
+                  </a:ext>
+                </a:extLst>
+              </a:blip>
+              <a:stretch>
+                <a:fillRect/>
+              </a:stretch>
+            </p:blipFill>
+            <p:spPr>
+              <a:xfrm>
+                <a:off x="4086824" y="3611351"/>
+                <a:ext cx="262441" cy="262441"/>
+              </a:xfrm>
+              <a:prstGeom prst="rect">
+                <a:avLst/>
+              </a:prstGeom>
+            </p:spPr>
+          </p:pic>
+        </p:grpSp>
+      </p:grpSp>
+      <p:grpSp>
+        <p:nvGrpSpPr>
+          <p:cNvPr id="124" name="그룹 123">
+            <a:extLst>
+              <a:ext uri="{FF2B5EF4-FFF2-40B4-BE49-F238E27FC236}">
+                <a16:creationId xmlns:a16="http://schemas.microsoft.com/office/drawing/2014/main" id="{6648A834-4440-4348-ACCE-696BA0410E64}"/>
+              </a:ext>
+            </a:extLst>
+          </p:cNvPr>
+          <p:cNvGrpSpPr/>
+          <p:nvPr/>
+        </p:nvGrpSpPr>
+        <p:grpSpPr>
+          <a:xfrm>
+            <a:off x="11482886" y="3608030"/>
+            <a:ext cx="393566" cy="900856"/>
+            <a:chOff x="724523" y="1506167"/>
+            <a:chExt cx="393566" cy="900856"/>
+          </a:xfrm>
+        </p:grpSpPr>
+        <p:grpSp>
+          <p:nvGrpSpPr>
+            <p:cNvPr id="125" name="그룹 124">
+              <a:extLst>
+                <a:ext uri="{FF2B5EF4-FFF2-40B4-BE49-F238E27FC236}">
+                  <a16:creationId xmlns:a16="http://schemas.microsoft.com/office/drawing/2014/main" id="{FF507317-3AD5-4D15-822C-84482898AC13}"/>
+                </a:ext>
+              </a:extLst>
+            </p:cNvPr>
+            <p:cNvGrpSpPr/>
+            <p:nvPr/>
+          </p:nvGrpSpPr>
+          <p:grpSpPr>
+            <a:xfrm>
+              <a:off x="724523" y="1506167"/>
+              <a:ext cx="393566" cy="393566"/>
+              <a:chOff x="3429577" y="1676530"/>
+              <a:chExt cx="393566" cy="393566"/>
+            </a:xfrm>
+          </p:grpSpPr>
+          <p:sp>
+            <p:nvSpPr>
+              <p:cNvPr id="143" name="타원 142">
+                <a:extLst>
+                  <a:ext uri="{FF2B5EF4-FFF2-40B4-BE49-F238E27FC236}">
+                    <a16:creationId xmlns:a16="http://schemas.microsoft.com/office/drawing/2014/main" id="{A7FC173D-F1DB-4353-9ABD-196A8471F586}"/>
+                  </a:ext>
+                </a:extLst>
+              </p:cNvPr>
+              <p:cNvSpPr/>
+              <p:nvPr/>
+            </p:nvSpPr>
+            <p:spPr>
+              <a:xfrm>
+                <a:off x="3437629" y="1686069"/>
+                <a:ext cx="369465" cy="369465"/>
+              </a:xfrm>
+              <a:prstGeom prst="ellipse">
+                <a:avLst/>
+              </a:prstGeom>
+              <a:solidFill>
+                <a:schemeClr val="bg1">
+                  <a:lumMod val="95000"/>
+                </a:schemeClr>
+              </a:solidFill>
+              <a:ln>
+                <a:noFill/>
+              </a:ln>
+            </p:spPr>
+            <p:style>
+              <a:lnRef idx="3">
+                <a:schemeClr val="lt1"/>
+              </a:lnRef>
+              <a:fillRef idx="1">
+                <a:schemeClr val="accent3"/>
+              </a:fillRef>
+              <a:effectRef idx="1">
+                <a:schemeClr val="accent3"/>
+              </a:effectRef>
+              <a:fontRef idx="minor">
+                <a:schemeClr val="lt1"/>
+              </a:fontRef>
+            </p:style>
+            <p:txBody>
+              <a:bodyPr rtlCol="0" anchor="ctr"/>
+              <a:lstStyle/>
+              <a:p>
+                <a:pPr algn="ctr"/>
+                <a:endParaRPr lang="ko-KR" altLang="en-US" sz="800" dirty="0"/>
+              </a:p>
+            </p:txBody>
+          </p:sp>
+          <p:pic>
+            <p:nvPicPr>
+              <p:cNvPr id="149" name="그래픽 148" descr="단일 톱니바퀴">
+                <a:extLst>
+                  <a:ext uri="{FF2B5EF4-FFF2-40B4-BE49-F238E27FC236}">
+                    <a16:creationId xmlns:a16="http://schemas.microsoft.com/office/drawing/2014/main" id="{DEE4B1BD-8A78-4840-8A8D-F1BCA149F767}"/>
+                  </a:ext>
+                </a:extLst>
+              </p:cNvPr>
+              <p:cNvPicPr>
+                <a:picLocks noChangeAspect="1"/>
+              </p:cNvPicPr>
+              <p:nvPr/>
+            </p:nvPicPr>
+            <p:blipFill>
+              <a:blip r:embed="rId3">
+                <a:extLst>
+                  <a:ext uri="{28A0092B-C50C-407E-A947-70E740481C1C}">
+                    <a14:useLocalDpi xmlns:a14="http://schemas.microsoft.com/office/drawing/2010/main" val="0"/>
+                  </a:ext>
+                  <a:ext uri="{96DAC541-7B7A-43D3-8B79-37D633B846F1}">
+                    <asvg:svgBlip xmlns:asvg="http://schemas.microsoft.com/office/drawing/2016/SVG/main" r:embed="rId4"/>
+                  </a:ext>
+                </a:extLst>
+              </a:blip>
+              <a:stretch>
+                <a:fillRect/>
+              </a:stretch>
+            </p:blipFill>
+            <p:spPr>
+              <a:xfrm>
+                <a:off x="3429577" y="1676530"/>
+                <a:ext cx="393566" cy="393566"/>
+              </a:xfrm>
+              <a:prstGeom prst="rect">
+                <a:avLst/>
+              </a:prstGeom>
+            </p:spPr>
+          </p:pic>
+        </p:grpSp>
+        <p:grpSp>
+          <p:nvGrpSpPr>
+            <p:cNvPr id="132" name="그룹 131">
+              <a:extLst>
+                <a:ext uri="{FF2B5EF4-FFF2-40B4-BE49-F238E27FC236}">
+                  <a16:creationId xmlns:a16="http://schemas.microsoft.com/office/drawing/2014/main" id="{A9482F0A-C91A-4BBE-98E7-D06E198F11D8}"/>
+                </a:ext>
+              </a:extLst>
+            </p:cNvPr>
+            <p:cNvGrpSpPr/>
+            <p:nvPr/>
+          </p:nvGrpSpPr>
+          <p:grpSpPr>
+            <a:xfrm>
+              <a:off x="732575" y="2037558"/>
+              <a:ext cx="369465" cy="369465"/>
+              <a:chOff x="3900106" y="3218788"/>
+              <a:chExt cx="369465" cy="369465"/>
+            </a:xfrm>
+          </p:grpSpPr>
+          <p:sp>
+            <p:nvSpPr>
+              <p:cNvPr id="133" name="타원 132">
+                <a:extLst>
+                  <a:ext uri="{FF2B5EF4-FFF2-40B4-BE49-F238E27FC236}">
+                    <a16:creationId xmlns:a16="http://schemas.microsoft.com/office/drawing/2014/main" id="{35A65B97-2AE3-4070-8F8C-947C1D16D19E}"/>
+                  </a:ext>
+                </a:extLst>
+              </p:cNvPr>
+              <p:cNvSpPr/>
+              <p:nvPr/>
+            </p:nvSpPr>
+            <p:spPr>
+              <a:xfrm>
+                <a:off x="3900106" y="3218788"/>
+                <a:ext cx="369465" cy="369465"/>
+              </a:xfrm>
+              <a:prstGeom prst="ellipse">
+                <a:avLst/>
+              </a:prstGeom>
+              <a:solidFill>
+                <a:schemeClr val="bg1">
+                  <a:lumMod val="95000"/>
+                </a:schemeClr>
+              </a:solidFill>
+              <a:ln>
+                <a:noFill/>
+              </a:ln>
+            </p:spPr>
+            <p:style>
+              <a:lnRef idx="3">
+                <a:schemeClr val="lt1"/>
+              </a:lnRef>
+              <a:fillRef idx="1">
+                <a:schemeClr val="accent3"/>
+              </a:fillRef>
+              <a:effectRef idx="1">
+                <a:schemeClr val="accent3"/>
+              </a:effectRef>
+              <a:fontRef idx="minor">
+                <a:schemeClr val="lt1"/>
+              </a:fontRef>
+            </p:style>
+            <p:txBody>
+              <a:bodyPr rtlCol="0" anchor="ctr"/>
+              <a:lstStyle/>
+              <a:p>
+                <a:pPr algn="ctr"/>
+                <a:endParaRPr lang="ko-KR" altLang="en-US" sz="800" dirty="0"/>
+              </a:p>
+            </p:txBody>
+          </p:sp>
+          <p:pic>
+            <p:nvPicPr>
+              <p:cNvPr id="140" name="그래픽 139" descr="RTL 목록">
+                <a:extLst>
+                  <a:ext uri="{FF2B5EF4-FFF2-40B4-BE49-F238E27FC236}">
+                    <a16:creationId xmlns:a16="http://schemas.microsoft.com/office/drawing/2014/main" id="{46E21433-1ADE-43FD-ADB8-23690E899D21}"/>
+                  </a:ext>
+                </a:extLst>
+              </p:cNvPr>
+              <p:cNvPicPr>
+                <a:picLocks noChangeAspect="1"/>
+              </p:cNvPicPr>
+              <p:nvPr/>
+            </p:nvPicPr>
+            <p:blipFill>
+              <a:blip r:embed="rId5">
+                <a:extLst>
+                  <a:ext uri="{28A0092B-C50C-407E-A947-70E740481C1C}">
+                    <a14:useLocalDpi xmlns:a14="http://schemas.microsoft.com/office/drawing/2010/main" val="0"/>
+                  </a:ext>
+                  <a:ext uri="{96DAC541-7B7A-43D3-8B79-37D633B846F1}">
+                    <asvg:svgBlip xmlns:asvg="http://schemas.microsoft.com/office/drawing/2016/SVG/main" r:embed="rId6"/>
+                  </a:ext>
+                </a:extLst>
+              </a:blip>
+              <a:stretch>
+                <a:fillRect/>
+              </a:stretch>
+            </p:blipFill>
+            <p:spPr>
+              <a:xfrm>
+                <a:off x="3961360" y="3280041"/>
+                <a:ext cx="246958" cy="246958"/>
+              </a:xfrm>
+              <a:prstGeom prst="rect">
+                <a:avLst/>
+              </a:prstGeom>
+            </p:spPr>
+          </p:pic>
+        </p:grpSp>
+      </p:grpSp>
     </p:spTree>
     <p:extLst>
       <p:ext uri="{BB962C8B-B14F-4D97-AF65-F5344CB8AC3E}">

</xml_diff>